<commit_message>
mise a jour pp
</commit_message>
<xml_diff>
--- a/Conception/INFOFO.pptx
+++ b/Conception/INFOFO.pptx
@@ -17,6 +17,7 @@
     <p:sldId id="265" r:id="rId11"/>
     <p:sldId id="266" r:id="rId12"/>
     <p:sldId id="267" r:id="rId13"/>
+    <p:sldId id="268" r:id="rId14"/>
   </p:sldIdLst>
   <p:sldSz cx="12192000" cy="6858000"/>
   <p:notesSz cx="6858000" cy="9144000"/>
@@ -115,6 +116,11 @@
       </a:defRPr>
     </a:lvl9pPr>
   </p:defaultTextStyle>
+  <p:extLst>
+    <p:ext uri="{EFAFB233-063F-42B5-8137-9DF3F51BA10A}">
+      <p15:sldGuideLst xmlns:p15="http://schemas.microsoft.com/office/powerpoint/2012/main"/>
+    </p:ext>
+  </p:extLst>
 </p:presentation>
 </file>
 
@@ -3456,10 +3462,199 @@
           </a:p>
         </p:txBody>
       </p:sp>
+      <p:pic>
+        <p:nvPicPr>
+          <p:cNvPr id="3" name="Image 2"/>
+          <p:cNvPicPr>
+            <a:picLocks noChangeAspect="1"/>
+          </p:cNvPicPr>
+          <p:nvPr/>
+        </p:nvPicPr>
+        <p:blipFill>
+          <a:blip r:embed="rId2"/>
+          <a:stretch>
+            <a:fillRect/>
+          </a:stretch>
+        </p:blipFill>
+        <p:spPr>
+          <a:xfrm>
+            <a:off x="441914" y="2077625"/>
+            <a:ext cx="4979966" cy="2788080"/>
+          </a:xfrm>
+          <a:prstGeom prst="rect">
+            <a:avLst/>
+          </a:prstGeom>
+        </p:spPr>
+      </p:pic>
+      <p:pic>
+        <p:nvPicPr>
+          <p:cNvPr id="4" name="Image 3"/>
+          <p:cNvPicPr>
+            <a:picLocks noChangeAspect="1"/>
+          </p:cNvPicPr>
+          <p:nvPr/>
+        </p:nvPicPr>
+        <p:blipFill>
+          <a:blip r:embed="rId3"/>
+          <a:stretch>
+            <a:fillRect/>
+          </a:stretch>
+        </p:blipFill>
+        <p:spPr>
+          <a:xfrm>
+            <a:off x="5648450" y="1704444"/>
+            <a:ext cx="5532168" cy="3534441"/>
+          </a:xfrm>
+          <a:prstGeom prst="rect">
+            <a:avLst/>
+          </a:prstGeom>
+        </p:spPr>
+      </p:pic>
     </p:spTree>
     <p:extLst>
       <p:ext uri="{BB962C8B-B14F-4D97-AF65-F5344CB8AC3E}">
         <p14:creationId xmlns:p14="http://schemas.microsoft.com/office/powerpoint/2010/main" val="6793766"/>
+      </p:ext>
+    </p:extLst>
+  </p:cSld>
+  <p:clrMapOvr>
+    <a:masterClrMapping/>
+  </p:clrMapOvr>
+</p:sld>
+</file>
+
+<file path=ppt/slides/slide13.xml><?xml version="1.0" encoding="utf-8"?>
+<p:sld xmlns:a="http://schemas.openxmlformats.org/drawingml/2006/main" xmlns:r="http://schemas.openxmlformats.org/officeDocument/2006/relationships" xmlns:p="http://schemas.openxmlformats.org/presentationml/2006/main">
+  <p:cSld>
+    <p:bg>
+      <p:bgPr>
+        <a:gradFill>
+          <a:gsLst>
+            <a:gs pos="0">
+              <a:schemeClr val="accent1">
+                <a:lumMod val="5000"/>
+                <a:lumOff val="95000"/>
+              </a:schemeClr>
+            </a:gs>
+            <a:gs pos="32000">
+              <a:schemeClr val="accent1">
+                <a:lumMod val="75000"/>
+              </a:schemeClr>
+            </a:gs>
+            <a:gs pos="69000">
+              <a:schemeClr val="accent1">
+                <a:lumMod val="60000"/>
+                <a:lumOff val="40000"/>
+              </a:schemeClr>
+            </a:gs>
+            <a:gs pos="100000">
+              <a:schemeClr val="accent1">
+                <a:lumMod val="30000"/>
+                <a:lumOff val="70000"/>
+              </a:schemeClr>
+            </a:gs>
+          </a:gsLst>
+          <a:lin ang="5400000" scaled="1"/>
+        </a:gradFill>
+        <a:effectLst/>
+      </p:bgPr>
+    </p:bg>
+    <p:spTree>
+      <p:nvGrpSpPr>
+        <p:cNvPr id="1" name=""/>
+        <p:cNvGrpSpPr/>
+        <p:nvPr/>
+      </p:nvGrpSpPr>
+      <p:grpSpPr>
+        <a:xfrm>
+          <a:off x="0" y="0"/>
+          <a:ext cx="0" cy="0"/>
+          <a:chOff x="0" y="0"/>
+          <a:chExt cx="0" cy="0"/>
+        </a:xfrm>
+      </p:grpSpPr>
+      <p:sp>
+        <p:nvSpPr>
+          <p:cNvPr id="2" name="Titre 1"/>
+          <p:cNvSpPr>
+            <a:spLocks noGrp="1"/>
+          </p:cNvSpPr>
+          <p:nvPr>
+            <p:ph type="title"/>
+          </p:nvPr>
+        </p:nvSpPr>
+        <p:spPr>
+          <a:xfrm>
+            <a:off x="164080" y="-202204"/>
+            <a:ext cx="10515600" cy="1325563"/>
+          </a:xfrm>
+        </p:spPr>
+        <p:txBody>
+          <a:bodyPr>
+            <a:normAutofit/>
+          </a:bodyPr>
+          <a:lstStyle/>
+          <a:p>
+            <a:r>
+              <a:rPr lang="fr-FR" sz="3600" dirty="0" smtClean="0"/>
+              <a:t>Modification du compte</a:t>
+            </a:r>
+            <a:endParaRPr lang="fr-FR" sz="3600" dirty="0"/>
+          </a:p>
+        </p:txBody>
+      </p:sp>
+      <p:pic>
+        <p:nvPicPr>
+          <p:cNvPr id="7" name="Image 6"/>
+          <p:cNvPicPr>
+            <a:picLocks noChangeAspect="1"/>
+          </p:cNvPicPr>
+          <p:nvPr/>
+        </p:nvPicPr>
+        <p:blipFill>
+          <a:blip r:embed="rId2"/>
+          <a:stretch>
+            <a:fillRect/>
+          </a:stretch>
+        </p:blipFill>
+        <p:spPr>
+          <a:xfrm>
+            <a:off x="7182069" y="807397"/>
+            <a:ext cx="4742241" cy="4856512"/>
+          </a:xfrm>
+          <a:prstGeom prst="rect">
+            <a:avLst/>
+          </a:prstGeom>
+        </p:spPr>
+      </p:pic>
+      <p:pic>
+        <p:nvPicPr>
+          <p:cNvPr id="9" name="Image 8"/>
+          <p:cNvPicPr>
+            <a:picLocks noChangeAspect="1"/>
+          </p:cNvPicPr>
+          <p:nvPr/>
+        </p:nvPicPr>
+        <p:blipFill>
+          <a:blip r:embed="rId3"/>
+          <a:stretch>
+            <a:fillRect/>
+          </a:stretch>
+        </p:blipFill>
+        <p:spPr>
+          <a:xfrm>
+            <a:off x="51264" y="1905554"/>
+            <a:ext cx="6860798" cy="2660198"/>
+          </a:xfrm>
+          <a:prstGeom prst="rect">
+            <a:avLst/>
+          </a:prstGeom>
+        </p:spPr>
+      </p:pic>
+    </p:spTree>
+    <p:extLst>
+      <p:ext uri="{BB962C8B-B14F-4D97-AF65-F5344CB8AC3E}">
+        <p14:creationId xmlns:p14="http://schemas.microsoft.com/office/powerpoint/2010/main" val="1048807597"/>
       </p:ext>
     </p:extLst>
   </p:cSld>
@@ -4176,11 +4371,7 @@
           <a:p>
             <a:r>
               <a:rPr lang="fr-FR" sz="3600" dirty="0" smtClean="0"/>
-              <a:t>Connexion au </a:t>
-            </a:r>
-            <a:r>
-              <a:rPr lang="fr-FR" sz="3600" dirty="0" smtClean="0"/>
-              <a:t>compte</a:t>
+              <a:t>Connexion au compte</a:t>
             </a:r>
             <a:endParaRPr lang="fr-FR" sz="3600" dirty="0"/>
           </a:p>
@@ -4321,11 +4512,7 @@
           <a:p>
             <a:r>
               <a:rPr lang="fr-FR" sz="3600" dirty="0" smtClean="0"/>
-              <a:t>Connexion au </a:t>
-            </a:r>
-            <a:r>
-              <a:rPr lang="fr-FR" sz="3600" dirty="0" smtClean="0"/>
-              <a:t>compte</a:t>
+              <a:t>Connexion au compte</a:t>
             </a:r>
             <a:endParaRPr lang="fr-FR" sz="3600" dirty="0"/>
           </a:p>

</xml_diff>